<commit_message>
fix: update PowerPoint templates for improved formatting and consistency
</commit_message>
<xml_diff>
--- a/public/templates/verso-1a-2coluna.pptx
+++ b/public/templates/verso-1a-2coluna.pptx
@@ -2975,7 +2975,7 @@
         <p:spPr>
           <a:xfrm>
             <a:off x="2660022" y="6053976"/>
-            <a:ext cx="4571894" cy="321711"/>
+            <a:ext cx="4571894" cy="290934"/>
           </a:xfrm>
           <a:prstGeom prst="rect">
             <a:avLst/>
@@ -3033,7 +3033,7 @@
               </a:lnSpc>
             </a:pPr>
             <a:r>
-              <a:rPr lang="pt-BR" sz="900" b="0" u="none" strike="noStrike" dirty="0">
+              <a:rPr lang="pt-BR" sz="700" b="0" u="none" strike="noStrike" dirty="0">
                 <a:solidFill>
                   <a:srgbClr val="000000"/>
                 </a:solidFill>
@@ -3043,7 +3043,7 @@
               <a:t>[</a:t>
             </a:r>
             <a:r>
-              <a:rPr lang="pt-BR" sz="900" b="0" u="none" strike="noStrike" err="1">
+              <a:rPr lang="pt-BR" sz="700" b="0" u="none" strike="noStrike" dirty="0" err="1">
                 <a:solidFill>
                   <a:srgbClr val="000000"/>
                 </a:solidFill>
@@ -3053,7 +3053,7 @@
               <a:t>local_treinamento</a:t>
             </a:r>
             <a:r>
-              <a:rPr lang="pt-BR" sz="900" b="0" u="none" strike="noStrike" dirty="0">
+              <a:rPr lang="pt-BR" sz="700" b="0" u="none" strike="noStrike" dirty="0">
                 <a:solidFill>
                   <a:srgbClr val="000000"/>
                 </a:solidFill>
@@ -3062,7 +3062,7 @@
               </a:rPr>
               <a:t>]</a:t>
             </a:r>
-            <a:endParaRPr lang="en-US" sz="900" b="0" u="none" strike="noStrike" dirty="0">
+            <a:endParaRPr lang="en-US" sz="700" b="0" u="none" strike="noStrike" dirty="0">
               <a:solidFill>
                 <a:srgbClr val="000000"/>
               </a:solidFill>

</xml_diff>